<commit_message>
Updated slides for a2
</commit_message>
<xml_diff>
--- a/A2/EECS4314 A2 Slides (TabsvsSpaces).pptx
+++ b/A2/EECS4314 A2 Slides (TabsvsSpaces).pptx
@@ -2441,7 +2441,7 @@
   <p:cSld>
     <p:spTree>
       <p:nvGrpSpPr>
-        <p:cNvPr id="338" name="Shape 338"/>
+        <p:cNvPr id="340" name="Shape 340"/>
         <p:cNvGrpSpPr/>
         <p:nvPr/>
       </p:nvGrpSpPr>
@@ -2455,7 +2455,7 @@
       </p:grpSpPr>
       <p:sp>
         <p:nvSpPr>
-          <p:cNvPr id="339" name="Shape 339"/>
+          <p:cNvPr id="341" name="Shape 341"/>
           <p:cNvSpPr/>
           <p:nvPr>
             <p:ph idx="2" type="sldImg"/>
@@ -2489,7 +2489,7 @@
       </p:sp>
       <p:sp>
         <p:nvSpPr>
-          <p:cNvPr id="340" name="Shape 340"/>
+          <p:cNvPr id="342" name="Shape 342"/>
           <p:cNvSpPr txBox="1"/>
           <p:nvPr>
             <p:ph idx="1" type="body"/>
@@ -2536,7 +2536,7 @@
   <p:cSld>
     <p:spTree>
       <p:nvGrpSpPr>
-        <p:cNvPr id="349" name="Shape 349"/>
+        <p:cNvPr id="353" name="Shape 353"/>
         <p:cNvGrpSpPr/>
         <p:nvPr/>
       </p:nvGrpSpPr>
@@ -2550,7 +2550,7 @@
       </p:grpSpPr>
       <p:sp>
         <p:nvSpPr>
-          <p:cNvPr id="350" name="Shape 350"/>
+          <p:cNvPr id="354" name="Shape 354"/>
           <p:cNvSpPr/>
           <p:nvPr>
             <p:ph idx="2" type="sldImg"/>
@@ -2584,7 +2584,7 @@
       </p:sp>
       <p:sp>
         <p:nvSpPr>
-          <p:cNvPr id="351" name="Shape 351"/>
+          <p:cNvPr id="355" name="Shape 355"/>
           <p:cNvSpPr txBox="1"/>
           <p:nvPr>
             <p:ph idx="1" type="body"/>
@@ -2631,7 +2631,7 @@
   <p:cSld>
     <p:spTree>
       <p:nvGrpSpPr>
-        <p:cNvPr id="358" name="Shape 358"/>
+        <p:cNvPr id="362" name="Shape 362"/>
         <p:cNvGrpSpPr/>
         <p:nvPr/>
       </p:nvGrpSpPr>
@@ -2645,7 +2645,7 @@
       </p:grpSpPr>
       <p:sp>
         <p:nvSpPr>
-          <p:cNvPr id="359" name="Shape 359"/>
+          <p:cNvPr id="363" name="Shape 363"/>
           <p:cNvSpPr/>
           <p:nvPr>
             <p:ph idx="2" type="sldImg"/>
@@ -2679,7 +2679,7 @@
       </p:sp>
       <p:sp>
         <p:nvSpPr>
-          <p:cNvPr id="360" name="Shape 360"/>
+          <p:cNvPr id="364" name="Shape 364"/>
           <p:cNvSpPr txBox="1"/>
           <p:nvPr>
             <p:ph idx="1" type="body"/>
@@ -2726,7 +2726,7 @@
   <p:cSld>
     <p:spTree>
       <p:nvGrpSpPr>
-        <p:cNvPr id="368" name="Shape 368"/>
+        <p:cNvPr id="374" name="Shape 374"/>
         <p:cNvGrpSpPr/>
         <p:nvPr/>
       </p:nvGrpSpPr>
@@ -2740,7 +2740,7 @@
       </p:grpSpPr>
       <p:sp>
         <p:nvSpPr>
-          <p:cNvPr id="369" name="Shape 369"/>
+          <p:cNvPr id="375" name="Shape 375"/>
           <p:cNvSpPr/>
           <p:nvPr>
             <p:ph idx="2" type="sldImg"/>
@@ -2774,7 +2774,7 @@
       </p:sp>
       <p:sp>
         <p:nvSpPr>
-          <p:cNvPr id="370" name="Shape 370"/>
+          <p:cNvPr id="376" name="Shape 376"/>
           <p:cNvSpPr txBox="1"/>
           <p:nvPr>
             <p:ph idx="1" type="body"/>
@@ -2821,7 +2821,7 @@
   <p:cSld>
     <p:spTree>
       <p:nvGrpSpPr>
-        <p:cNvPr id="378" name="Shape 378"/>
+        <p:cNvPr id="386" name="Shape 386"/>
         <p:cNvGrpSpPr/>
         <p:nvPr/>
       </p:nvGrpSpPr>
@@ -2835,7 +2835,7 @@
       </p:grpSpPr>
       <p:sp>
         <p:nvSpPr>
-          <p:cNvPr id="379" name="Shape 379"/>
+          <p:cNvPr id="387" name="Shape 387"/>
           <p:cNvSpPr/>
           <p:nvPr>
             <p:ph idx="2" type="sldImg"/>
@@ -2869,7 +2869,7 @@
       </p:sp>
       <p:sp>
         <p:nvSpPr>
-          <p:cNvPr id="380" name="Shape 380"/>
+          <p:cNvPr id="388" name="Shape 388"/>
           <p:cNvSpPr txBox="1"/>
           <p:nvPr>
             <p:ph idx="1" type="body"/>
@@ -2916,7 +2916,7 @@
   <p:cSld>
     <p:spTree>
       <p:nvGrpSpPr>
-        <p:cNvPr id="388" name="Shape 388"/>
+        <p:cNvPr id="396" name="Shape 396"/>
         <p:cNvGrpSpPr/>
         <p:nvPr/>
       </p:nvGrpSpPr>
@@ -2930,7 +2930,7 @@
       </p:grpSpPr>
       <p:sp>
         <p:nvSpPr>
-          <p:cNvPr id="389" name="Shape 389"/>
+          <p:cNvPr id="397" name="Shape 397"/>
           <p:cNvSpPr/>
           <p:nvPr>
             <p:ph idx="2" type="sldImg"/>
@@ -2964,7 +2964,7 @@
       </p:sp>
       <p:sp>
         <p:nvSpPr>
-          <p:cNvPr id="390" name="Shape 390"/>
+          <p:cNvPr id="398" name="Shape 398"/>
           <p:cNvSpPr txBox="1"/>
           <p:nvPr>
             <p:ph idx="1" type="body"/>
@@ -3110,7 +3110,7 @@
   <p:cSld>
     <p:spTree>
       <p:nvGrpSpPr>
-        <p:cNvPr id="397" name="Shape 397"/>
+        <p:cNvPr id="405" name="Shape 405"/>
         <p:cNvGrpSpPr/>
         <p:nvPr/>
       </p:nvGrpSpPr>
@@ -3124,7 +3124,7 @@
       </p:grpSpPr>
       <p:sp>
         <p:nvSpPr>
-          <p:cNvPr id="398" name="Shape 398"/>
+          <p:cNvPr id="406" name="Shape 406"/>
           <p:cNvSpPr/>
           <p:nvPr>
             <p:ph idx="2" type="sldImg"/>
@@ -3158,7 +3158,7 @@
       </p:sp>
       <p:sp>
         <p:nvSpPr>
-          <p:cNvPr id="399" name="Shape 399"/>
+          <p:cNvPr id="407" name="Shape 407"/>
           <p:cNvSpPr txBox="1"/>
           <p:nvPr>
             <p:ph idx="1" type="body"/>
@@ -9614,8 +9614,8 @@
         </p:blipFill>
         <p:spPr>
           <a:xfrm>
-            <a:off x="727650" y="1398925"/>
-            <a:ext cx="7688699" cy="2171833"/>
+            <a:off x="729450" y="1398923"/>
+            <a:ext cx="7688699" cy="2171827"/>
           </a:xfrm>
           <a:prstGeom prst="rect">
             <a:avLst/>
@@ -14362,6 +14362,80 @@
           </a:p>
         </p:txBody>
       </p:sp>
+      <p:pic>
+        <p:nvPicPr>
+          <p:cNvPr id="338" name="Shape 338"/>
+          <p:cNvPicPr preferRelativeResize="0"/>
+          <p:nvPr/>
+        </p:nvPicPr>
+        <p:blipFill>
+          <a:blip r:embed="rId5">
+            <a:alphaModFix/>
+          </a:blip>
+          <a:stretch>
+            <a:fillRect/>
+          </a:stretch>
+        </p:blipFill>
+        <p:spPr>
+          <a:xfrm>
+            <a:off x="7513676" y="56525"/>
+            <a:ext cx="1571325" cy="1287650"/>
+          </a:xfrm>
+          <a:prstGeom prst="rect">
+            <a:avLst/>
+          </a:prstGeom>
+          <a:noFill/>
+          <a:ln>
+            <a:noFill/>
+          </a:ln>
+        </p:spPr>
+      </p:pic>
+      <p:sp>
+        <p:nvSpPr>
+          <p:cNvPr id="339" name="Shape 339"/>
+          <p:cNvSpPr/>
+          <p:nvPr/>
+        </p:nvSpPr>
+        <p:spPr>
+          <a:xfrm>
+            <a:off x="7513675" y="647400"/>
+            <a:ext cx="681900" cy="94500"/>
+          </a:xfrm>
+          <a:prstGeom prst="roundRect">
+            <a:avLst>
+              <a:gd fmla="val 16667" name="adj"/>
+            </a:avLst>
+          </a:prstGeom>
+          <a:noFill/>
+          <a:ln cap="flat" cmpd="sng" w="9525">
+            <a:solidFill>
+              <a:srgbClr val="FF0000"/>
+            </a:solidFill>
+            <a:prstDash val="solid"/>
+            <a:round/>
+            <a:headEnd len="med" w="med" type="none"/>
+            <a:tailEnd len="med" w="med" type="none"/>
+          </a:ln>
+        </p:spPr>
+        <p:txBody>
+          <a:bodyPr anchorCtr="0" anchor="ctr" bIns="91425" lIns="91425" rIns="91425" wrap="square" tIns="91425">
+            <a:noAutofit/>
+          </a:bodyPr>
+          <a:lstStyle/>
+          <a:p>
+            <a:pPr lvl="0">
+              <a:spcBef>
+                <a:spcPts val="0"/>
+              </a:spcBef>
+              <a:buNone/>
+            </a:pPr>
+            <a:r>
+              <a:t/>
+            </a:r>
+            <a:endParaRPr/>
+          </a:p>
+        </p:txBody>
+      </p:sp>
     </p:spTree>
   </p:cSld>
   <p:clrMapOvr>
@@ -14375,7 +14449,7 @@
   <p:cSld>
     <p:spTree>
       <p:nvGrpSpPr>
-        <p:cNvPr id="341" name="Shape 341"/>
+        <p:cNvPr id="343" name="Shape 343"/>
         <p:cNvGrpSpPr/>
         <p:nvPr/>
       </p:nvGrpSpPr>
@@ -14389,7 +14463,7 @@
       </p:grpSpPr>
       <p:sp>
         <p:nvSpPr>
-          <p:cNvPr id="342" name="Shape 342"/>
+          <p:cNvPr id="344" name="Shape 344"/>
           <p:cNvSpPr txBox="1"/>
           <p:nvPr>
             <p:ph type="title"/>
@@ -14425,7 +14499,7 @@
       </p:sp>
       <p:sp>
         <p:nvSpPr>
-          <p:cNvPr id="343" name="Shape 343"/>
+          <p:cNvPr id="345" name="Shape 345"/>
           <p:cNvSpPr txBox="1"/>
           <p:nvPr>
             <p:ph idx="12" type="sldNum"/>
@@ -14461,7 +14535,7 @@
       </p:sp>
       <p:pic>
         <p:nvPicPr>
-          <p:cNvPr id="344" name="Shape 344"/>
+          <p:cNvPr id="346" name="Shape 346"/>
           <p:cNvPicPr preferRelativeResize="0"/>
           <p:nvPr/>
         </p:nvPicPr>
@@ -14489,7 +14563,7 @@
       </p:pic>
       <p:sp>
         <p:nvSpPr>
-          <p:cNvPr id="345" name="Shape 345"/>
+          <p:cNvPr id="347" name="Shape 347"/>
           <p:cNvSpPr txBox="1"/>
           <p:nvPr/>
         </p:nvSpPr>
@@ -14533,7 +14607,7 @@
       </p:sp>
       <p:pic>
         <p:nvPicPr>
-          <p:cNvPr descr="Screenshot (226).png" id="346" name="Shape 346"/>
+          <p:cNvPr descr="Screenshot (226).png" id="348" name="Shape 348"/>
           <p:cNvPicPr preferRelativeResize="0"/>
           <p:nvPr/>
         </p:nvPicPr>
@@ -14561,7 +14635,7 @@
       </p:pic>
       <p:sp>
         <p:nvSpPr>
-          <p:cNvPr id="347" name="Shape 347"/>
+          <p:cNvPr id="349" name="Shape 349"/>
           <p:cNvSpPr txBox="1"/>
           <p:nvPr/>
         </p:nvSpPr>
@@ -14599,7 +14673,7 @@
       </p:sp>
       <p:sp>
         <p:nvSpPr>
-          <p:cNvPr id="348" name="Shape 348"/>
+          <p:cNvPr id="350" name="Shape 350"/>
           <p:cNvSpPr txBox="1"/>
           <p:nvPr/>
         </p:nvSpPr>
@@ -14632,6 +14706,80 @@
               <a:rPr b="1" lang="en" sz="1200"/>
               <a:t>Conceptual</a:t>
             </a:r>
+          </a:p>
+        </p:txBody>
+      </p:sp>
+      <p:pic>
+        <p:nvPicPr>
+          <p:cNvPr id="351" name="Shape 351"/>
+          <p:cNvPicPr preferRelativeResize="0"/>
+          <p:nvPr/>
+        </p:nvPicPr>
+        <p:blipFill>
+          <a:blip r:embed="rId5">
+            <a:alphaModFix/>
+          </a:blip>
+          <a:stretch>
+            <a:fillRect/>
+          </a:stretch>
+        </p:blipFill>
+        <p:spPr>
+          <a:xfrm>
+            <a:off x="7513676" y="56525"/>
+            <a:ext cx="1571325" cy="1287650"/>
+          </a:xfrm>
+          <a:prstGeom prst="rect">
+            <a:avLst/>
+          </a:prstGeom>
+          <a:noFill/>
+          <a:ln>
+            <a:noFill/>
+          </a:ln>
+        </p:spPr>
+      </p:pic>
+      <p:sp>
+        <p:nvSpPr>
+          <p:cNvPr id="352" name="Shape 352"/>
+          <p:cNvSpPr/>
+          <p:nvPr/>
+        </p:nvSpPr>
+        <p:spPr>
+          <a:xfrm>
+            <a:off x="7513675" y="647400"/>
+            <a:ext cx="681900" cy="94500"/>
+          </a:xfrm>
+          <a:prstGeom prst="roundRect">
+            <a:avLst>
+              <a:gd fmla="val 16667" name="adj"/>
+            </a:avLst>
+          </a:prstGeom>
+          <a:noFill/>
+          <a:ln cap="flat" cmpd="sng" w="9525">
+            <a:solidFill>
+              <a:srgbClr val="FF0000"/>
+            </a:solidFill>
+            <a:prstDash val="solid"/>
+            <a:round/>
+            <a:headEnd len="med" w="med" type="none"/>
+            <a:tailEnd len="med" w="med" type="none"/>
+          </a:ln>
+        </p:spPr>
+        <p:txBody>
+          <a:bodyPr anchorCtr="0" anchor="ctr" bIns="91425" lIns="91425" rIns="91425" wrap="square" tIns="91425">
+            <a:noAutofit/>
+          </a:bodyPr>
+          <a:lstStyle/>
+          <a:p>
+            <a:pPr lvl="0">
+              <a:spcBef>
+                <a:spcPts val="0"/>
+              </a:spcBef>
+              <a:buNone/>
+            </a:pPr>
+            <a:r>
+              <a:t/>
+            </a:r>
+            <a:endParaRPr/>
           </a:p>
         </p:txBody>
       </p:sp>
@@ -14648,7 +14796,7 @@
   <p:cSld>
     <p:spTree>
       <p:nvGrpSpPr>
-        <p:cNvPr id="352" name="Shape 352"/>
+        <p:cNvPr id="356" name="Shape 356"/>
         <p:cNvGrpSpPr/>
         <p:nvPr/>
       </p:nvGrpSpPr>
@@ -14662,7 +14810,7 @@
       </p:grpSpPr>
       <p:sp>
         <p:nvSpPr>
-          <p:cNvPr id="353" name="Shape 353"/>
+          <p:cNvPr id="357" name="Shape 357"/>
           <p:cNvSpPr txBox="1"/>
           <p:nvPr>
             <p:ph type="title"/>
@@ -14698,7 +14846,7 @@
       </p:sp>
       <p:sp>
         <p:nvSpPr>
-          <p:cNvPr id="354" name="Shape 354"/>
+          <p:cNvPr id="358" name="Shape 358"/>
           <p:cNvSpPr txBox="1"/>
           <p:nvPr>
             <p:ph idx="1" type="body"/>
@@ -14778,7 +14926,7 @@
       </p:sp>
       <p:sp>
         <p:nvSpPr>
-          <p:cNvPr id="355" name="Shape 355"/>
+          <p:cNvPr id="359" name="Shape 359"/>
           <p:cNvSpPr txBox="1"/>
           <p:nvPr>
             <p:ph idx="12" type="sldNum"/>
@@ -14814,7 +14962,7 @@
       </p:sp>
       <p:pic>
         <p:nvPicPr>
-          <p:cNvPr id="356" name="Shape 356"/>
+          <p:cNvPr id="360" name="Shape 360"/>
           <p:cNvPicPr preferRelativeResize="0"/>
           <p:nvPr/>
         </p:nvPicPr>
@@ -14842,7 +14990,7 @@
       </p:pic>
       <p:sp>
         <p:nvSpPr>
-          <p:cNvPr id="357" name="Shape 357"/>
+          <p:cNvPr id="361" name="Shape 361"/>
           <p:cNvSpPr/>
           <p:nvPr/>
         </p:nvSpPr>
@@ -14899,7 +15047,7 @@
   <p:cSld>
     <p:spTree>
       <p:nvGrpSpPr>
-        <p:cNvPr id="361" name="Shape 361"/>
+        <p:cNvPr id="365" name="Shape 365"/>
         <p:cNvGrpSpPr/>
         <p:nvPr/>
       </p:nvGrpSpPr>
@@ -14913,7 +15061,7 @@
       </p:grpSpPr>
       <p:sp>
         <p:nvSpPr>
-          <p:cNvPr id="362" name="Shape 362"/>
+          <p:cNvPr id="366" name="Shape 366"/>
           <p:cNvSpPr txBox="1"/>
           <p:nvPr>
             <p:ph type="title"/>
@@ -14953,7 +15101,7 @@
       </p:sp>
       <p:sp>
         <p:nvSpPr>
-          <p:cNvPr id="363" name="Shape 363"/>
+          <p:cNvPr id="367" name="Shape 367"/>
           <p:cNvSpPr txBox="1"/>
           <p:nvPr>
             <p:ph idx="12" type="sldNum"/>
@@ -14989,7 +15137,7 @@
       </p:sp>
       <p:pic>
         <p:nvPicPr>
-          <p:cNvPr descr="exectoALL.png" id="364" name="Shape 364"/>
+          <p:cNvPr descr="exectoALL.png" id="368" name="Shape 368"/>
           <p:cNvPicPr preferRelativeResize="0"/>
           <p:nvPr/>
         </p:nvPicPr>
@@ -15017,7 +15165,7 @@
       </p:pic>
       <p:pic>
         <p:nvPicPr>
-          <p:cNvPr id="365" name="Shape 365"/>
+          <p:cNvPr id="369" name="Shape 369"/>
           <p:cNvPicPr preferRelativeResize="0"/>
           <p:nvPr/>
         </p:nvPicPr>
@@ -15045,7 +15193,7 @@
       </p:pic>
       <p:sp>
         <p:nvSpPr>
-          <p:cNvPr id="366" name="Shape 366"/>
+          <p:cNvPr id="370" name="Shape 370"/>
           <p:cNvSpPr txBox="1"/>
           <p:nvPr/>
         </p:nvSpPr>
@@ -15083,7 +15231,7 @@
       </p:sp>
       <p:sp>
         <p:nvSpPr>
-          <p:cNvPr id="367" name="Shape 367"/>
+          <p:cNvPr id="371" name="Shape 371"/>
           <p:cNvSpPr txBox="1"/>
           <p:nvPr/>
         </p:nvSpPr>
@@ -15116,6 +15264,80 @@
               <a:rPr b="1" lang="en" sz="1200"/>
               <a:t>Conceptual</a:t>
             </a:r>
+          </a:p>
+        </p:txBody>
+      </p:sp>
+      <p:pic>
+        <p:nvPicPr>
+          <p:cNvPr id="372" name="Shape 372"/>
+          <p:cNvPicPr preferRelativeResize="0"/>
+          <p:nvPr/>
+        </p:nvPicPr>
+        <p:blipFill>
+          <a:blip r:embed="rId5">
+            <a:alphaModFix/>
+          </a:blip>
+          <a:stretch>
+            <a:fillRect/>
+          </a:stretch>
+        </p:blipFill>
+        <p:spPr>
+          <a:xfrm>
+            <a:off x="7513676" y="56525"/>
+            <a:ext cx="1571325" cy="1287650"/>
+          </a:xfrm>
+          <a:prstGeom prst="rect">
+            <a:avLst/>
+          </a:prstGeom>
+          <a:noFill/>
+          <a:ln>
+            <a:noFill/>
+          </a:ln>
+        </p:spPr>
+      </p:pic>
+      <p:sp>
+        <p:nvSpPr>
+          <p:cNvPr id="373" name="Shape 373"/>
+          <p:cNvSpPr/>
+          <p:nvPr/>
+        </p:nvSpPr>
+        <p:spPr>
+          <a:xfrm>
+            <a:off x="7513675" y="647400"/>
+            <a:ext cx="681900" cy="94500"/>
+          </a:xfrm>
+          <a:prstGeom prst="roundRect">
+            <a:avLst>
+              <a:gd fmla="val 16667" name="adj"/>
+            </a:avLst>
+          </a:prstGeom>
+          <a:noFill/>
+          <a:ln cap="flat" cmpd="sng" w="9525">
+            <a:solidFill>
+              <a:srgbClr val="FF0000"/>
+            </a:solidFill>
+            <a:prstDash val="solid"/>
+            <a:round/>
+            <a:headEnd len="med" w="med" type="none"/>
+            <a:tailEnd len="med" w="med" type="none"/>
+          </a:ln>
+        </p:spPr>
+        <p:txBody>
+          <a:bodyPr anchorCtr="0" anchor="ctr" bIns="91425" lIns="91425" rIns="91425" wrap="square" tIns="91425">
+            <a:noAutofit/>
+          </a:bodyPr>
+          <a:lstStyle/>
+          <a:p>
+            <a:pPr lvl="0">
+              <a:spcBef>
+                <a:spcPts val="0"/>
+              </a:spcBef>
+              <a:buNone/>
+            </a:pPr>
+            <a:r>
+              <a:t/>
+            </a:r>
+            <a:endParaRPr/>
           </a:p>
         </p:txBody>
       </p:sp>
@@ -15132,7 +15354,7 @@
   <p:cSld>
     <p:spTree>
       <p:nvGrpSpPr>
-        <p:cNvPr id="371" name="Shape 371"/>
+        <p:cNvPr id="377" name="Shape 377"/>
         <p:cNvGrpSpPr/>
         <p:nvPr/>
       </p:nvGrpSpPr>
@@ -15146,7 +15368,7 @@
       </p:grpSpPr>
       <p:sp>
         <p:nvSpPr>
-          <p:cNvPr id="372" name="Shape 372"/>
+          <p:cNvPr id="378" name="Shape 378"/>
           <p:cNvSpPr txBox="1"/>
           <p:nvPr>
             <p:ph type="title"/>
@@ -15198,7 +15420,7 @@
       </p:sp>
       <p:pic>
         <p:nvPicPr>
-          <p:cNvPr descr="alltoExec.png" id="373" name="Shape 373"/>
+          <p:cNvPr descr="alltoExec.png" id="379" name="Shape 379"/>
           <p:cNvPicPr preferRelativeResize="0"/>
           <p:nvPr/>
         </p:nvPicPr>
@@ -15226,7 +15448,7 @@
       </p:pic>
       <p:pic>
         <p:nvPicPr>
-          <p:cNvPr id="374" name="Shape 374"/>
+          <p:cNvPr id="380" name="Shape 380"/>
           <p:cNvPicPr preferRelativeResize="0"/>
           <p:nvPr/>
         </p:nvPicPr>
@@ -15254,7 +15476,7 @@
       </p:pic>
       <p:sp>
         <p:nvSpPr>
-          <p:cNvPr id="375" name="Shape 375"/>
+          <p:cNvPr id="381" name="Shape 381"/>
           <p:cNvSpPr txBox="1"/>
           <p:nvPr>
             <p:ph idx="12" type="sldNum"/>
@@ -15290,7 +15512,7 @@
       </p:sp>
       <p:sp>
         <p:nvSpPr>
-          <p:cNvPr id="376" name="Shape 376"/>
+          <p:cNvPr id="382" name="Shape 382"/>
           <p:cNvSpPr txBox="1"/>
           <p:nvPr/>
         </p:nvSpPr>
@@ -15328,7 +15550,7 @@
       </p:sp>
       <p:sp>
         <p:nvSpPr>
-          <p:cNvPr id="377" name="Shape 377"/>
+          <p:cNvPr id="383" name="Shape 383"/>
           <p:cNvSpPr txBox="1"/>
           <p:nvPr/>
         </p:nvSpPr>
@@ -15361,6 +15583,80 @@
               <a:rPr b="1" lang="en" sz="1200"/>
               <a:t>Conceptual</a:t>
             </a:r>
+          </a:p>
+        </p:txBody>
+      </p:sp>
+      <p:pic>
+        <p:nvPicPr>
+          <p:cNvPr id="384" name="Shape 384"/>
+          <p:cNvPicPr preferRelativeResize="0"/>
+          <p:nvPr/>
+        </p:nvPicPr>
+        <p:blipFill>
+          <a:blip r:embed="rId5">
+            <a:alphaModFix/>
+          </a:blip>
+          <a:stretch>
+            <a:fillRect/>
+          </a:stretch>
+        </p:blipFill>
+        <p:spPr>
+          <a:xfrm>
+            <a:off x="7513676" y="56525"/>
+            <a:ext cx="1571325" cy="1287650"/>
+          </a:xfrm>
+          <a:prstGeom prst="rect">
+            <a:avLst/>
+          </a:prstGeom>
+          <a:noFill/>
+          <a:ln>
+            <a:noFill/>
+          </a:ln>
+        </p:spPr>
+      </p:pic>
+      <p:sp>
+        <p:nvSpPr>
+          <p:cNvPr id="385" name="Shape 385"/>
+          <p:cNvSpPr/>
+          <p:nvPr/>
+        </p:nvSpPr>
+        <p:spPr>
+          <a:xfrm>
+            <a:off x="7513675" y="647400"/>
+            <a:ext cx="681900" cy="94500"/>
+          </a:xfrm>
+          <a:prstGeom prst="roundRect">
+            <a:avLst>
+              <a:gd fmla="val 16667" name="adj"/>
+            </a:avLst>
+          </a:prstGeom>
+          <a:noFill/>
+          <a:ln cap="flat" cmpd="sng" w="9525">
+            <a:solidFill>
+              <a:srgbClr val="FF0000"/>
+            </a:solidFill>
+            <a:prstDash val="solid"/>
+            <a:round/>
+            <a:headEnd len="med" w="med" type="none"/>
+            <a:tailEnd len="med" w="med" type="none"/>
+          </a:ln>
+        </p:spPr>
+        <p:txBody>
+          <a:bodyPr anchorCtr="0" anchor="ctr" bIns="91425" lIns="91425" rIns="91425" wrap="square" tIns="91425">
+            <a:noAutofit/>
+          </a:bodyPr>
+          <a:lstStyle/>
+          <a:p>
+            <a:pPr lvl="0">
+              <a:spcBef>
+                <a:spcPts val="0"/>
+              </a:spcBef>
+              <a:buNone/>
+            </a:pPr>
+            <a:r>
+              <a:t/>
+            </a:r>
+            <a:endParaRPr/>
           </a:p>
         </p:txBody>
       </p:sp>
@@ -15377,7 +15673,7 @@
   <p:cSld>
     <p:spTree>
       <p:nvGrpSpPr>
-        <p:cNvPr id="381" name="Shape 381"/>
+        <p:cNvPr id="389" name="Shape 389"/>
         <p:cNvGrpSpPr/>
         <p:nvPr/>
       </p:nvGrpSpPr>
@@ -15391,7 +15687,7 @@
       </p:grpSpPr>
       <p:sp>
         <p:nvSpPr>
-          <p:cNvPr id="382" name="Shape 382"/>
+          <p:cNvPr id="390" name="Shape 390"/>
           <p:cNvSpPr txBox="1"/>
           <p:nvPr>
             <p:ph type="title"/>
@@ -15427,7 +15723,7 @@
       </p:sp>
       <p:sp>
         <p:nvSpPr>
-          <p:cNvPr id="383" name="Shape 383"/>
+          <p:cNvPr id="391" name="Shape 391"/>
           <p:cNvSpPr txBox="1"/>
           <p:nvPr>
             <p:ph idx="1" type="body"/>
@@ -15463,7 +15759,7 @@
       </p:sp>
       <p:sp>
         <p:nvSpPr>
-          <p:cNvPr id="384" name="Shape 384"/>
+          <p:cNvPr id="392" name="Shape 392"/>
           <p:cNvSpPr txBox="1"/>
           <p:nvPr>
             <p:ph idx="12" type="sldNum"/>
@@ -15499,7 +15795,7 @@
       </p:sp>
       <p:pic>
         <p:nvPicPr>
-          <p:cNvPr id="385" name="Shape 385"/>
+          <p:cNvPr id="393" name="Shape 393"/>
           <p:cNvPicPr preferRelativeResize="0"/>
           <p:nvPr/>
         </p:nvPicPr>
@@ -15527,7 +15823,7 @@
       </p:pic>
       <p:pic>
         <p:nvPicPr>
-          <p:cNvPr id="386" name="Shape 386"/>
+          <p:cNvPr id="394" name="Shape 394"/>
           <p:cNvPicPr preferRelativeResize="0"/>
           <p:nvPr/>
         </p:nvPicPr>
@@ -15555,7 +15851,7 @@
       </p:pic>
       <p:sp>
         <p:nvSpPr>
-          <p:cNvPr id="387" name="Shape 387"/>
+          <p:cNvPr id="395" name="Shape 395"/>
           <p:cNvSpPr/>
           <p:nvPr/>
         </p:nvSpPr>
@@ -15612,7 +15908,7 @@
   <p:cSld>
     <p:spTree>
       <p:nvGrpSpPr>
-        <p:cNvPr id="391" name="Shape 391"/>
+        <p:cNvPr id="399" name="Shape 399"/>
         <p:cNvGrpSpPr/>
         <p:nvPr/>
       </p:nvGrpSpPr>
@@ -15626,7 +15922,7 @@
       </p:grpSpPr>
       <p:sp>
         <p:nvSpPr>
-          <p:cNvPr id="392" name="Shape 392"/>
+          <p:cNvPr id="400" name="Shape 400"/>
           <p:cNvSpPr txBox="1"/>
           <p:nvPr>
             <p:ph type="title"/>
@@ -15662,7 +15958,7 @@
       </p:sp>
       <p:sp>
         <p:nvSpPr>
-          <p:cNvPr id="393" name="Shape 393"/>
+          <p:cNvPr id="401" name="Shape 401"/>
           <p:cNvSpPr txBox="1"/>
           <p:nvPr>
             <p:ph idx="1" type="body"/>
@@ -15770,7 +16066,7 @@
       </p:sp>
       <p:sp>
         <p:nvSpPr>
-          <p:cNvPr id="394" name="Shape 394"/>
+          <p:cNvPr id="402" name="Shape 402"/>
           <p:cNvSpPr txBox="1"/>
           <p:nvPr>
             <p:ph idx="12" type="sldNum"/>
@@ -15806,7 +16102,7 @@
       </p:sp>
       <p:pic>
         <p:nvPicPr>
-          <p:cNvPr id="395" name="Shape 395"/>
+          <p:cNvPr id="403" name="Shape 403"/>
           <p:cNvPicPr preferRelativeResize="0"/>
           <p:nvPr/>
         </p:nvPicPr>
@@ -15834,7 +16130,7 @@
       </p:pic>
       <p:sp>
         <p:nvSpPr>
-          <p:cNvPr id="396" name="Shape 396"/>
+          <p:cNvPr id="404" name="Shape 404"/>
           <p:cNvSpPr/>
           <p:nvPr/>
         </p:nvSpPr>
@@ -16108,7 +16404,7 @@
   <p:cSld>
     <p:spTree>
       <p:nvGrpSpPr>
-        <p:cNvPr id="400" name="Shape 400"/>
+        <p:cNvPr id="408" name="Shape 408"/>
         <p:cNvGrpSpPr/>
         <p:nvPr/>
       </p:nvGrpSpPr>
@@ -16122,7 +16418,7 @@
       </p:grpSpPr>
       <p:sp>
         <p:nvSpPr>
-          <p:cNvPr id="401" name="Shape 401"/>
+          <p:cNvPr id="409" name="Shape 409"/>
           <p:cNvSpPr txBox="1"/>
           <p:nvPr>
             <p:ph type="title"/>
@@ -16158,7 +16454,7 @@
       </p:sp>
       <p:sp>
         <p:nvSpPr>
-          <p:cNvPr id="402" name="Shape 402"/>
+          <p:cNvPr id="410" name="Shape 410"/>
           <p:cNvSpPr txBox="1"/>
           <p:nvPr>
             <p:ph idx="12" type="sldNum"/>

</xml_diff>